<commit_message>
He hecho la parte de los trade-off sliders
</commit_message>
<xml_diff>
--- a/Presentación PSG.pptx
+++ b/Presentación PSG.pptx
@@ -139,6 +139,860 @@
 </p:presentation>
 </file>
 
+<file path=ppt/charts/chart1.xml><?xml version="1.0" encoding="utf-8"?>
+<c:chartSpace xmlns:c="http://schemas.openxmlformats.org/drawingml/2006/chart" xmlns:a="http://schemas.openxmlformats.org/drawingml/2006/main" xmlns:r="http://schemas.openxmlformats.org/officeDocument/2006/relationships" xmlns:c16r2="http://schemas.microsoft.com/office/drawing/2015/06/chart">
+  <c:date1904 val="0"/>
+  <c:lang val="es-ES"/>
+  <c:roundedCorners val="0"/>
+  <mc:AlternateContent xmlns:mc="http://schemas.openxmlformats.org/markup-compatibility/2006">
+    <mc:Choice xmlns:c14="http://schemas.microsoft.com/office/drawing/2007/8/2/chart" Requires="c14">
+      <c14:style val="102"/>
+    </mc:Choice>
+    <mc:Fallback>
+      <c:style val="2"/>
+    </mc:Fallback>
+  </mc:AlternateContent>
+  <c:chart>
+    <c:autoTitleDeleted val="1"/>
+    <c:plotArea>
+      <c:layout/>
+      <c:lineChart>
+        <c:grouping val="standard"/>
+        <c:varyColors val="0"/>
+        <c:ser>
+          <c:idx val="0"/>
+          <c:order val="0"/>
+          <c:tx>
+            <c:strRef>
+              <c:f>Hoja1!$B$1</c:f>
+              <c:strCache>
+                <c:ptCount val="1"/>
+                <c:pt idx="0">
+                  <c:v>Importancia</c:v>
+                </c:pt>
+              </c:strCache>
+            </c:strRef>
+          </c:tx>
+          <c:spPr>
+            <a:ln w="34925" cap="rnd">
+              <a:solidFill>
+                <a:schemeClr val="accent1"/>
+              </a:solidFill>
+              <a:round/>
+            </a:ln>
+            <a:effectLst>
+              <a:innerShdw blurRad="63500" dist="25400" dir="13500000">
+                <a:srgbClr val="000000">
+                  <a:alpha val="75000"/>
+                </a:srgbClr>
+              </a:innerShdw>
+            </a:effectLst>
+          </c:spPr>
+          <c:marker>
+            <c:symbol val="none"/>
+          </c:marker>
+          <c:cat>
+            <c:strRef>
+              <c:f>Hoja1!$A$2:$A$8</c:f>
+              <c:strCache>
+                <c:ptCount val="7"/>
+                <c:pt idx="0">
+                  <c:v>Tiempo Mínimo</c:v>
+                </c:pt>
+                <c:pt idx="1">
+                  <c:v>Coste Mínimo</c:v>
+                </c:pt>
+                <c:pt idx="2">
+                  <c:v>Rendimiento</c:v>
+                </c:pt>
+                <c:pt idx="3">
+                  <c:v>Cumplimiento de los Rquisitos</c:v>
+                </c:pt>
+                <c:pt idx="4">
+                  <c:v>Calidad</c:v>
+                </c:pt>
+                <c:pt idx="5">
+                  <c:v>Seguridad</c:v>
+                </c:pt>
+                <c:pt idx="6">
+                  <c:v>Experincia del usuario</c:v>
+                </c:pt>
+              </c:strCache>
+            </c:strRef>
+          </c:cat>
+          <c:val>
+            <c:numRef>
+              <c:f>Hoja1!$B$2:$B$8</c:f>
+              <c:numCache>
+                <c:formatCode>General</c:formatCode>
+                <c:ptCount val="7"/>
+                <c:pt idx="0">
+                  <c:v>3</c:v>
+                </c:pt>
+                <c:pt idx="1">
+                  <c:v>4</c:v>
+                </c:pt>
+                <c:pt idx="2">
+                  <c:v>3</c:v>
+                </c:pt>
+                <c:pt idx="3">
+                  <c:v>2</c:v>
+                </c:pt>
+                <c:pt idx="4">
+                  <c:v>4</c:v>
+                </c:pt>
+                <c:pt idx="5">
+                  <c:v>4</c:v>
+                </c:pt>
+                <c:pt idx="6">
+                  <c:v>5</c:v>
+                </c:pt>
+              </c:numCache>
+            </c:numRef>
+          </c:val>
+          <c:smooth val="0"/>
+          <c:extLst>
+            <c:ext xmlns:c16="http://schemas.microsoft.com/office/drawing/2014/chart" uri="{C3380CC4-5D6E-409C-BE32-E72D297353CC}">
+              <c16:uniqueId val="{00000000-F7FE-4611-B332-D9BC5E7D4077}"/>
+            </c:ext>
+          </c:extLst>
+        </c:ser>
+        <c:dLbls>
+          <c:showLegendKey val="0"/>
+          <c:showVal val="0"/>
+          <c:showCatName val="0"/>
+          <c:showSerName val="0"/>
+          <c:showPercent val="0"/>
+          <c:showBubbleSize val="0"/>
+        </c:dLbls>
+        <c:smooth val="0"/>
+        <c:axId val="561518152"/>
+        <c:axId val="561515528"/>
+      </c:lineChart>
+      <c:catAx>
+        <c:axId val="561518152"/>
+        <c:scaling>
+          <c:orientation val="minMax"/>
+        </c:scaling>
+        <c:delete val="0"/>
+        <c:axPos val="b"/>
+        <c:numFmt formatCode="General" sourceLinked="1"/>
+        <c:majorTickMark val="none"/>
+        <c:minorTickMark val="none"/>
+        <c:tickLblPos val="nextTo"/>
+        <c:spPr>
+          <a:noFill/>
+          <a:ln w="12700" cap="flat" cmpd="sng" algn="ctr">
+            <a:solidFill>
+              <a:schemeClr val="tx1">
+                <a:lumMod val="15000"/>
+                <a:lumOff val="85000"/>
+              </a:schemeClr>
+            </a:solidFill>
+            <a:round/>
+          </a:ln>
+          <a:effectLst/>
+        </c:spPr>
+        <c:txPr>
+          <a:bodyPr rot="-60000000" spcFirstLastPara="1" vertOverflow="ellipsis" vert="horz" wrap="square" anchor="ctr" anchorCtr="1"/>
+          <a:lstStyle/>
+          <a:p>
+            <a:pPr>
+              <a:defRPr sz="1197" b="0" i="0" u="none" strike="noStrike" kern="1200" baseline="0">
+                <a:solidFill>
+                  <a:schemeClr val="tx1">
+                    <a:lumMod val="65000"/>
+                    <a:lumOff val="35000"/>
+                  </a:schemeClr>
+                </a:solidFill>
+                <a:latin typeface="+mn-lt"/>
+                <a:ea typeface="+mn-ea"/>
+                <a:cs typeface="+mn-cs"/>
+              </a:defRPr>
+            </a:pPr>
+            <a:endParaRPr lang="es-ES"/>
+          </a:p>
+        </c:txPr>
+        <c:crossAx val="561515528"/>
+        <c:crosses val="autoZero"/>
+        <c:auto val="1"/>
+        <c:lblAlgn val="ctr"/>
+        <c:lblOffset val="100"/>
+        <c:noMultiLvlLbl val="0"/>
+      </c:catAx>
+      <c:valAx>
+        <c:axId val="561515528"/>
+        <c:scaling>
+          <c:orientation val="minMax"/>
+          <c:max val="5"/>
+        </c:scaling>
+        <c:delete val="0"/>
+        <c:axPos val="l"/>
+        <c:majorGridlines>
+          <c:spPr>
+            <a:ln w="9525" cap="flat" cmpd="sng" algn="ctr">
+              <a:solidFill>
+                <a:schemeClr val="tx1">
+                  <a:lumMod val="15000"/>
+                  <a:lumOff val="85000"/>
+                </a:schemeClr>
+              </a:solidFill>
+              <a:round/>
+            </a:ln>
+            <a:effectLst/>
+          </c:spPr>
+        </c:majorGridlines>
+        <c:numFmt formatCode="General" sourceLinked="1"/>
+        <c:majorTickMark val="none"/>
+        <c:minorTickMark val="none"/>
+        <c:tickLblPos val="nextTo"/>
+        <c:spPr>
+          <a:noFill/>
+          <a:ln>
+            <a:noFill/>
+          </a:ln>
+          <a:effectLst/>
+        </c:spPr>
+        <c:txPr>
+          <a:bodyPr rot="-60000000" spcFirstLastPara="1" vertOverflow="ellipsis" vert="horz" wrap="square" anchor="ctr" anchorCtr="1"/>
+          <a:lstStyle/>
+          <a:p>
+            <a:pPr>
+              <a:defRPr sz="1197" b="0" i="0" u="none" strike="noStrike" kern="1200" baseline="0">
+                <a:solidFill>
+                  <a:schemeClr val="tx1">
+                    <a:lumMod val="65000"/>
+                    <a:lumOff val="35000"/>
+                  </a:schemeClr>
+                </a:solidFill>
+                <a:latin typeface="+mn-lt"/>
+                <a:ea typeface="+mn-ea"/>
+                <a:cs typeface="+mn-cs"/>
+              </a:defRPr>
+            </a:pPr>
+            <a:endParaRPr lang="es-ES"/>
+          </a:p>
+        </c:txPr>
+        <c:crossAx val="561518152"/>
+        <c:crosses val="autoZero"/>
+        <c:crossBetween val="between"/>
+        <c:majorUnit val="1"/>
+      </c:valAx>
+      <c:spPr>
+        <a:noFill/>
+        <a:ln>
+          <a:noFill/>
+        </a:ln>
+        <a:effectLst/>
+      </c:spPr>
+    </c:plotArea>
+    <c:legend>
+      <c:legendPos val="b"/>
+      <c:overlay val="0"/>
+      <c:spPr>
+        <a:noFill/>
+        <a:ln>
+          <a:noFill/>
+        </a:ln>
+        <a:effectLst/>
+      </c:spPr>
+      <c:txPr>
+        <a:bodyPr rot="0" spcFirstLastPara="1" vertOverflow="ellipsis" vert="horz" wrap="square" anchor="ctr" anchorCtr="1"/>
+        <a:lstStyle/>
+        <a:p>
+          <a:pPr>
+            <a:defRPr sz="1197" b="0" i="0" u="none" strike="noStrike" kern="1200" baseline="0">
+              <a:solidFill>
+                <a:schemeClr val="tx1">
+                  <a:lumMod val="65000"/>
+                  <a:lumOff val="35000"/>
+                </a:schemeClr>
+              </a:solidFill>
+              <a:latin typeface="+mn-lt"/>
+              <a:ea typeface="+mn-ea"/>
+              <a:cs typeface="+mn-cs"/>
+            </a:defRPr>
+          </a:pPr>
+          <a:endParaRPr lang="es-ES"/>
+        </a:p>
+      </c:txPr>
+    </c:legend>
+    <c:plotVisOnly val="1"/>
+    <c:dispBlanksAs val="gap"/>
+    <c:extLst>
+      <c:ext xmlns:c16r3="http://schemas.microsoft.com/office/drawing/2017/03/chart" uri="{56B9EC1D-385E-4148-901F-78D8002777C0}">
+        <c16r3:dataDisplayOptions16>
+          <c16r3:dispNaAsBlank val="1"/>
+        </c16r3:dataDisplayOptions16>
+      </c:ext>
+    </c:extLst>
+    <c:showDLblsOverMax val="0"/>
+  </c:chart>
+  <c:spPr>
+    <a:noFill/>
+    <a:ln>
+      <a:noFill/>
+    </a:ln>
+    <a:effectLst/>
+  </c:spPr>
+  <c:txPr>
+    <a:bodyPr/>
+    <a:lstStyle/>
+    <a:p>
+      <a:pPr>
+        <a:defRPr/>
+      </a:pPr>
+      <a:endParaRPr lang="es-ES"/>
+    </a:p>
+  </c:txPr>
+  <c:externalData r:id="rId3">
+    <c:autoUpdate val="0"/>
+  </c:externalData>
+</c:chartSpace>
+</file>
+
+<file path=ppt/charts/colors1.xml><?xml version="1.0" encoding="utf-8"?>
+<cs:colorStyle xmlns:cs="http://schemas.microsoft.com/office/drawing/2012/chartStyle" xmlns:a="http://schemas.openxmlformats.org/drawingml/2006/main" meth="cycle" id="10">
+  <a:schemeClr val="accent1"/>
+  <a:schemeClr val="accent2"/>
+  <a:schemeClr val="accent3"/>
+  <a:schemeClr val="accent4"/>
+  <a:schemeClr val="accent5"/>
+  <a:schemeClr val="accent6"/>
+  <cs:variation/>
+  <cs:variation>
+    <a:lumMod val="60000"/>
+  </cs:variation>
+  <cs:variation>
+    <a:lumMod val="80000"/>
+    <a:lumOff val="20000"/>
+  </cs:variation>
+  <cs:variation>
+    <a:lumMod val="80000"/>
+  </cs:variation>
+  <cs:variation>
+    <a:lumMod val="60000"/>
+    <a:lumOff val="40000"/>
+  </cs:variation>
+  <cs:variation>
+    <a:lumMod val="50000"/>
+  </cs:variation>
+  <cs:variation>
+    <a:lumMod val="70000"/>
+    <a:lumOff val="30000"/>
+  </cs:variation>
+  <cs:variation>
+    <a:lumMod val="70000"/>
+  </cs:variation>
+  <cs:variation>
+    <a:lumMod val="50000"/>
+    <a:lumOff val="50000"/>
+  </cs:variation>
+</cs:colorStyle>
+</file>
+
+<file path=ppt/charts/style1.xml><?xml version="1.0" encoding="utf-8"?>
+<cs:chartStyle xmlns:cs="http://schemas.microsoft.com/office/drawing/2012/chartStyle" xmlns:a="http://schemas.openxmlformats.org/drawingml/2006/main" id="342">
+  <cs:axisTitle>
+    <cs:lnRef idx="0"/>
+    <cs:fillRef idx="0"/>
+    <cs:effectRef idx="0"/>
+    <cs:fontRef idx="minor">
+      <a:schemeClr val="tx1">
+        <a:lumMod val="65000"/>
+        <a:lumOff val="35000"/>
+      </a:schemeClr>
+    </cs:fontRef>
+    <cs:defRPr sz="1197" kern="1200"/>
+  </cs:axisTitle>
+  <cs:categoryAxis>
+    <cs:lnRef idx="0"/>
+    <cs:fillRef idx="0"/>
+    <cs:effectRef idx="0"/>
+    <cs:fontRef idx="minor">
+      <a:schemeClr val="tx1">
+        <a:lumMod val="65000"/>
+        <a:lumOff val="35000"/>
+      </a:schemeClr>
+    </cs:fontRef>
+    <cs:spPr>
+      <a:ln w="12700" cap="flat" cmpd="sng" algn="ctr">
+        <a:solidFill>
+          <a:schemeClr val="tx1">
+            <a:lumMod val="15000"/>
+            <a:lumOff val="85000"/>
+          </a:schemeClr>
+        </a:solidFill>
+        <a:round/>
+      </a:ln>
+    </cs:spPr>
+    <cs:defRPr sz="1197" kern="1200"/>
+  </cs:categoryAxis>
+  <cs:chartArea mods="allowNoFillOverride allowNoLineOverride">
+    <cs:lnRef idx="0"/>
+    <cs:fillRef idx="0"/>
+    <cs:effectRef idx="0"/>
+    <cs:fontRef idx="minor">
+      <a:schemeClr val="tx2"/>
+    </cs:fontRef>
+    <cs:spPr>
+      <a:solidFill>
+        <a:schemeClr val="bg1"/>
+      </a:solidFill>
+      <a:ln w="9525" cap="flat" cmpd="sng" algn="ctr">
+        <a:solidFill>
+          <a:schemeClr val="tx1">
+            <a:lumMod val="15000"/>
+            <a:lumOff val="85000"/>
+          </a:schemeClr>
+        </a:solidFill>
+        <a:round/>
+      </a:ln>
+    </cs:spPr>
+    <cs:defRPr sz="1197" kern="1200"/>
+  </cs:chartArea>
+  <cs:dataLabel>
+    <cs:lnRef idx="0"/>
+    <cs:fillRef idx="0"/>
+    <cs:effectRef idx="0"/>
+    <cs:fontRef idx="minor">
+      <a:schemeClr val="tx1">
+        <a:lumMod val="75000"/>
+        <a:lumOff val="25000"/>
+      </a:schemeClr>
+    </cs:fontRef>
+    <cs:defRPr sz="1197" kern="1200"/>
+  </cs:dataLabel>
+  <cs:dataLabelCallout>
+    <cs:lnRef idx="0"/>
+    <cs:fillRef idx="0"/>
+    <cs:effectRef idx="0"/>
+    <cs:fontRef idx="minor">
+      <a:schemeClr val="dk1">
+        <a:lumMod val="65000"/>
+        <a:lumOff val="35000"/>
+      </a:schemeClr>
+    </cs:fontRef>
+    <cs:spPr>
+      <a:solidFill>
+        <a:schemeClr val="lt1"/>
+      </a:solidFill>
+      <a:ln>
+        <a:solidFill>
+          <a:schemeClr val="dk1">
+            <a:lumMod val="25000"/>
+            <a:lumOff val="75000"/>
+          </a:schemeClr>
+        </a:solidFill>
+      </a:ln>
+    </cs:spPr>
+    <cs:defRPr sz="1197" kern="1200"/>
+    <cs:bodyPr rot="0" spcFirstLastPara="1" vertOverflow="clip" horzOverflow="clip" vert="horz" wrap="square" lIns="36576" tIns="18288" rIns="36576" bIns="18288" anchor="ctr" anchorCtr="1">
+      <a:spAutoFit/>
+    </cs:bodyPr>
+  </cs:dataLabelCallout>
+  <cs:dataPoint>
+    <cs:lnRef idx="0"/>
+    <cs:fillRef idx="3">
+      <cs:styleClr val="auto"/>
+    </cs:fillRef>
+    <cs:effectRef idx="3"/>
+    <cs:fontRef idx="minor">
+      <a:schemeClr val="tx1"/>
+    </cs:fontRef>
+  </cs:dataPoint>
+  <cs:dataPoint3D>
+    <cs:lnRef idx="0"/>
+    <cs:fillRef idx="3">
+      <cs:styleClr val="auto"/>
+    </cs:fillRef>
+    <cs:effectRef idx="3"/>
+    <cs:fontRef idx="minor">
+      <a:schemeClr val="tx1"/>
+    </cs:fontRef>
+  </cs:dataPoint3D>
+  <cs:dataPointLine>
+    <cs:lnRef idx="0">
+      <cs:styleClr val="auto"/>
+    </cs:lnRef>
+    <cs:fillRef idx="3"/>
+    <cs:effectRef idx="3"/>
+    <cs:fontRef idx="minor">
+      <a:schemeClr val="tx1"/>
+    </cs:fontRef>
+    <cs:spPr>
+      <a:ln w="34925" cap="rnd">
+        <a:solidFill>
+          <a:schemeClr val="phClr"/>
+        </a:solidFill>
+        <a:round/>
+      </a:ln>
+    </cs:spPr>
+  </cs:dataPointLine>
+  <cs:dataPointMarker>
+    <cs:lnRef idx="0">
+      <cs:styleClr val="auto"/>
+    </cs:lnRef>
+    <cs:fillRef idx="3">
+      <cs:styleClr val="auto"/>
+    </cs:fillRef>
+    <cs:effectRef idx="3"/>
+    <cs:fontRef idx="minor">
+      <a:schemeClr val="tx1"/>
+    </cs:fontRef>
+    <cs:spPr>
+      <a:ln w="9525">
+        <a:solidFill>
+          <a:schemeClr val="phClr"/>
+        </a:solidFill>
+        <a:round/>
+      </a:ln>
+    </cs:spPr>
+  </cs:dataPointMarker>
+  <cs:dataPointMarkerLayout symbol="circle" size="6"/>
+  <cs:dataPointWireframe>
+    <cs:lnRef idx="0">
+      <cs:styleClr val="auto"/>
+    </cs:lnRef>
+    <cs:fillRef idx="3"/>
+    <cs:effectRef idx="3"/>
+    <cs:fontRef idx="minor">
+      <a:schemeClr val="tx1"/>
+    </cs:fontRef>
+    <cs:spPr>
+      <a:ln w="9525" cap="rnd">
+        <a:solidFill>
+          <a:schemeClr val="phClr"/>
+        </a:solidFill>
+        <a:round/>
+      </a:ln>
+    </cs:spPr>
+  </cs:dataPointWireframe>
+  <cs:dataTable>
+    <cs:lnRef idx="0"/>
+    <cs:fillRef idx="0"/>
+    <cs:effectRef idx="0"/>
+    <cs:fontRef idx="minor">
+      <a:schemeClr val="tx1">
+        <a:lumMod val="65000"/>
+        <a:lumOff val="35000"/>
+      </a:schemeClr>
+    </cs:fontRef>
+    <cs:spPr>
+      <a:noFill/>
+      <a:ln w="9525" cap="flat" cmpd="sng" algn="ctr">
+        <a:solidFill>
+          <a:schemeClr val="tx1">
+            <a:lumMod val="15000"/>
+            <a:lumOff val="85000"/>
+          </a:schemeClr>
+        </a:solidFill>
+        <a:round/>
+      </a:ln>
+    </cs:spPr>
+    <cs:defRPr sz="1197" kern="1200"/>
+  </cs:dataTable>
+  <cs:downBar>
+    <cs:lnRef idx="0"/>
+    <cs:fillRef idx="0"/>
+    <cs:effectRef idx="0"/>
+    <cs:fontRef idx="minor">
+      <a:schemeClr val="dk1"/>
+    </cs:fontRef>
+    <cs:spPr>
+      <a:solidFill>
+        <a:schemeClr val="dk1">
+          <a:lumMod val="65000"/>
+          <a:lumOff val="35000"/>
+        </a:schemeClr>
+      </a:solidFill>
+      <a:ln w="9525">
+        <a:solidFill>
+          <a:schemeClr val="tx1">
+            <a:lumMod val="65000"/>
+            <a:lumOff val="35000"/>
+          </a:schemeClr>
+        </a:solidFill>
+      </a:ln>
+    </cs:spPr>
+  </cs:downBar>
+  <cs:dropLine>
+    <cs:lnRef idx="0"/>
+    <cs:fillRef idx="0"/>
+    <cs:effectRef idx="0"/>
+    <cs:fontRef idx="minor">
+      <a:schemeClr val="tx1"/>
+    </cs:fontRef>
+    <cs:spPr>
+      <a:ln w="9525" cap="flat" cmpd="sng" algn="ctr">
+        <a:solidFill>
+          <a:schemeClr val="tx1">
+            <a:lumMod val="35000"/>
+            <a:lumOff val="65000"/>
+          </a:schemeClr>
+        </a:solidFill>
+        <a:round/>
+      </a:ln>
+    </cs:spPr>
+  </cs:dropLine>
+  <cs:errorBar>
+    <cs:lnRef idx="0"/>
+    <cs:fillRef idx="0"/>
+    <cs:effectRef idx="0"/>
+    <cs:fontRef idx="minor">
+      <a:schemeClr val="tx1"/>
+    </cs:fontRef>
+    <cs:spPr>
+      <a:ln w="9525" cap="flat" cmpd="sng" algn="ctr">
+        <a:solidFill>
+          <a:schemeClr val="tx1">
+            <a:lumMod val="65000"/>
+            <a:lumOff val="35000"/>
+          </a:schemeClr>
+        </a:solidFill>
+        <a:round/>
+      </a:ln>
+    </cs:spPr>
+  </cs:errorBar>
+  <cs:floor>
+    <cs:lnRef idx="0"/>
+    <cs:fillRef idx="0"/>
+    <cs:effectRef idx="0"/>
+    <cs:fontRef idx="minor">
+      <a:schemeClr val="lt1"/>
+    </cs:fontRef>
+  </cs:floor>
+  <cs:gridlineMajor>
+    <cs:lnRef idx="0"/>
+    <cs:fillRef idx="0"/>
+    <cs:effectRef idx="0"/>
+    <cs:fontRef idx="minor">
+      <a:schemeClr val="tx1"/>
+    </cs:fontRef>
+    <cs:spPr>
+      <a:ln w="9525" cap="flat" cmpd="sng" algn="ctr">
+        <a:solidFill>
+          <a:schemeClr val="tx1">
+            <a:lumMod val="15000"/>
+            <a:lumOff val="85000"/>
+          </a:schemeClr>
+        </a:solidFill>
+        <a:round/>
+      </a:ln>
+    </cs:spPr>
+  </cs:gridlineMajor>
+  <cs:gridlineMinor>
+    <cs:lnRef idx="0"/>
+    <cs:fillRef idx="0"/>
+    <cs:effectRef idx="0"/>
+    <cs:fontRef idx="minor">
+      <a:schemeClr val="tx1"/>
+    </cs:fontRef>
+    <cs:spPr>
+      <a:ln w="9525" cap="flat" cmpd="sng" algn="ctr">
+        <a:solidFill>
+          <a:schemeClr val="tx1">
+            <a:lumMod val="5000"/>
+            <a:lumOff val="95000"/>
+          </a:schemeClr>
+        </a:solidFill>
+        <a:round/>
+      </a:ln>
+    </cs:spPr>
+  </cs:gridlineMinor>
+  <cs:hiLoLine>
+    <cs:lnRef idx="0"/>
+    <cs:fillRef idx="0"/>
+    <cs:effectRef idx="0"/>
+    <cs:fontRef idx="minor">
+      <a:schemeClr val="tx1"/>
+    </cs:fontRef>
+    <cs:spPr>
+      <a:ln w="9525" cap="flat" cmpd="sng" algn="ctr">
+        <a:solidFill>
+          <a:schemeClr val="tx1">
+            <a:lumMod val="75000"/>
+            <a:lumOff val="25000"/>
+          </a:schemeClr>
+        </a:solidFill>
+        <a:round/>
+      </a:ln>
+    </cs:spPr>
+  </cs:hiLoLine>
+  <cs:leaderLine>
+    <cs:lnRef idx="0"/>
+    <cs:fillRef idx="0"/>
+    <cs:effectRef idx="0"/>
+    <cs:fontRef idx="minor">
+      <a:schemeClr val="tx1"/>
+    </cs:fontRef>
+    <cs:spPr>
+      <a:ln w="9525" cap="flat" cmpd="sng" algn="ctr">
+        <a:solidFill>
+          <a:schemeClr val="tx1">
+            <a:lumMod val="35000"/>
+            <a:lumOff val="65000"/>
+          </a:schemeClr>
+        </a:solidFill>
+        <a:round/>
+      </a:ln>
+    </cs:spPr>
+  </cs:leaderLine>
+  <cs:legend>
+    <cs:lnRef idx="0"/>
+    <cs:fillRef idx="0"/>
+    <cs:effectRef idx="0"/>
+    <cs:fontRef idx="minor">
+      <a:schemeClr val="tx1">
+        <a:lumMod val="65000"/>
+        <a:lumOff val="35000"/>
+      </a:schemeClr>
+    </cs:fontRef>
+    <cs:defRPr sz="1197" kern="1200"/>
+  </cs:legend>
+  <cs:plotArea>
+    <cs:lnRef idx="0"/>
+    <cs:fillRef idx="0"/>
+    <cs:effectRef idx="0"/>
+    <cs:fontRef idx="minor">
+      <a:schemeClr val="lt1"/>
+    </cs:fontRef>
+  </cs:plotArea>
+  <cs:plotArea3D>
+    <cs:lnRef idx="0"/>
+    <cs:fillRef idx="0"/>
+    <cs:effectRef idx="0"/>
+    <cs:fontRef idx="minor">
+      <a:schemeClr val="lt1"/>
+    </cs:fontRef>
+  </cs:plotArea3D>
+  <cs:seriesAxis>
+    <cs:lnRef idx="0"/>
+    <cs:fillRef idx="0"/>
+    <cs:effectRef idx="0"/>
+    <cs:fontRef idx="minor">
+      <a:schemeClr val="tx1">
+        <a:lumMod val="65000"/>
+        <a:lumOff val="35000"/>
+      </a:schemeClr>
+    </cs:fontRef>
+    <cs:spPr>
+      <a:ln w="12700" cap="flat" cmpd="sng" algn="ctr">
+        <a:solidFill>
+          <a:schemeClr val="tx1">
+            <a:lumMod val="15000"/>
+            <a:lumOff val="85000"/>
+          </a:schemeClr>
+        </a:solidFill>
+        <a:round/>
+      </a:ln>
+    </cs:spPr>
+    <cs:defRPr sz="1197" kern="1200"/>
+  </cs:seriesAxis>
+  <cs:seriesLine>
+    <cs:lnRef idx="0"/>
+    <cs:fillRef idx="0"/>
+    <cs:effectRef idx="0"/>
+    <cs:fontRef idx="minor">
+      <a:schemeClr val="tx1"/>
+    </cs:fontRef>
+    <cs:spPr>
+      <a:ln w="9525" cap="flat" cmpd="sng" algn="ctr">
+        <a:solidFill>
+          <a:schemeClr val="tx1">
+            <a:lumMod val="35000"/>
+            <a:lumOff val="65000"/>
+          </a:schemeClr>
+        </a:solidFill>
+        <a:round/>
+      </a:ln>
+    </cs:spPr>
+  </cs:seriesLine>
+  <cs:title>
+    <cs:lnRef idx="0"/>
+    <cs:fillRef idx="0"/>
+    <cs:effectRef idx="0"/>
+    <cs:fontRef idx="minor">
+      <a:schemeClr val="tx1">
+        <a:lumMod val="65000"/>
+        <a:lumOff val="35000"/>
+      </a:schemeClr>
+    </cs:fontRef>
+    <cs:defRPr sz="2128" b="1" kern="1200" baseline="0"/>
+  </cs:title>
+  <cs:trendline>
+    <cs:lnRef idx="0">
+      <cs:styleClr val="auto"/>
+    </cs:lnRef>
+    <cs:fillRef idx="0"/>
+    <cs:effectRef idx="0"/>
+    <cs:fontRef idx="minor">
+      <a:schemeClr val="lt1"/>
+    </cs:fontRef>
+    <cs:spPr>
+      <a:ln w="19050" cap="rnd">
+        <a:solidFill>
+          <a:schemeClr val="phClr"/>
+        </a:solidFill>
+      </a:ln>
+    </cs:spPr>
+  </cs:trendline>
+  <cs:trendlineLabel>
+    <cs:lnRef idx="0"/>
+    <cs:fillRef idx="0"/>
+    <cs:effectRef idx="0"/>
+    <cs:fontRef idx="minor">
+      <a:schemeClr val="tx1">
+        <a:lumMod val="65000"/>
+        <a:lumOff val="35000"/>
+      </a:schemeClr>
+    </cs:fontRef>
+    <cs:defRPr sz="1197" kern="1200"/>
+  </cs:trendlineLabel>
+  <cs:upBar>
+    <cs:lnRef idx="0"/>
+    <cs:fillRef idx="0"/>
+    <cs:effectRef idx="0"/>
+    <cs:fontRef idx="minor">
+      <a:schemeClr val="dk1"/>
+    </cs:fontRef>
+    <cs:spPr>
+      <a:solidFill>
+        <a:schemeClr val="lt1"/>
+      </a:solidFill>
+      <a:ln w="9525">
+        <a:solidFill>
+          <a:schemeClr val="tx1">
+            <a:lumMod val="15000"/>
+            <a:lumOff val="85000"/>
+          </a:schemeClr>
+        </a:solidFill>
+      </a:ln>
+    </cs:spPr>
+  </cs:upBar>
+  <cs:valueAxis>
+    <cs:lnRef idx="0"/>
+    <cs:fillRef idx="0"/>
+    <cs:effectRef idx="0"/>
+    <cs:fontRef idx="minor">
+      <a:schemeClr val="tx1">
+        <a:lumMod val="65000"/>
+        <a:lumOff val="35000"/>
+      </a:schemeClr>
+    </cs:fontRef>
+    <cs:defRPr sz="1197" kern="1200"/>
+  </cs:valueAxis>
+  <cs:wall>
+    <cs:lnRef idx="0"/>
+    <cs:fillRef idx="0"/>
+    <cs:effectRef idx="0"/>
+    <cs:fontRef idx="minor">
+      <a:schemeClr val="lt1"/>
+    </cs:fontRef>
+  </cs:wall>
+</cs:chartStyle>
+</file>
+
 <file path=ppt/slideLayouts/slideLayout1.xml><?xml version="1.0" encoding="utf-8"?>
 <p:sldLayout xmlns:a="http://schemas.openxmlformats.org/drawingml/2006/main" xmlns:r="http://schemas.openxmlformats.org/officeDocument/2006/relationships" xmlns:p="http://schemas.openxmlformats.org/presentationml/2006/main" type="title" preserve="1">
   <p:cSld name="Diapositiva de título">
@@ -234,7 +1088,7 @@
           <a:effectLst/>
           <a:extLst>
             <a:ext uri="{91240B29-F687-4f45-9708-019B960494DF}">
-              <a14:hiddenLine xmlns:a14="http://schemas.microsoft.com/office/drawing/2010/main" xmlns="" w="9525">
+              <a14:hiddenLine xmlns="" xmlns:a14="http://schemas.microsoft.com/office/drawing/2010/main" w="9525">
                 <a:solidFill>
                   <a:srgbClr val="000000"/>
                 </a:solidFill>
@@ -427,7 +1281,7 @@
             <a:fld id="{08B9EBBA-996F-894A-B54A-D6246ED52CEA}" type="datetimeFigureOut">
               <a:rPr lang="en-US" dirty="0"/>
               <a:pPr/>
-              <a:t>10/17/2018</a:t>
+              <a:t>10/20/2018</a:t>
             </a:fld>
             <a:endParaRPr lang="en-US" dirty="0"/>
           </a:p>
@@ -742,7 +1596,7 @@
             <a:fld id="{18C79C5D-2A6F-F04D-97DA-BEF2467B64E4}" type="datetimeFigureOut">
               <a:rPr lang="en-US" dirty="0"/>
               <a:pPr/>
-              <a:t>10/17/2018</a:t>
+              <a:t>10/20/2018</a:t>
             </a:fld>
             <a:endParaRPr lang="en-US" dirty="0"/>
           </a:p>
@@ -1227,7 +2081,7 @@
             <a:fld id="{8DFA1846-DA80-1C48-A609-854EA85C59AD}" type="datetimeFigureOut">
               <a:rPr lang="en-US" dirty="0"/>
               <a:pPr/>
-              <a:t>10/17/2018</a:t>
+              <a:t>10/20/2018</a:t>
             </a:fld>
             <a:endParaRPr lang="en-US" dirty="0"/>
           </a:p>
@@ -1593,7 +2447,7 @@
             <a:fld id="{FBF54567-0DE4-3F47-BF90-CB84690072F9}" type="datetimeFigureOut">
               <a:rPr lang="en-US" dirty="0"/>
               <a:pPr/>
-              <a:t>10/17/2018</a:t>
+              <a:t>10/20/2018</a:t>
             </a:fld>
             <a:endParaRPr lang="en-US" dirty="0"/>
           </a:p>
@@ -1744,7 +2598,7 @@
           <a:ln/>
           <a:extLst>
             <a:ext uri="{91240B29-F687-4f45-9708-019B960494DF}">
-              <a14:hiddenLine xmlns:a14="http://schemas.microsoft.com/office/drawing/2010/main" xmlns="" w="9525">
+              <a14:hiddenLine xmlns="" xmlns:a14="http://schemas.microsoft.com/office/drawing/2010/main" w="9525">
                 <a:solidFill>
                   <a:srgbClr val="000000"/>
                 </a:solidFill>
@@ -1863,7 +2717,7 @@
             <a:fld id="{C6C52C72-DE31-F449-A4ED-4C594FD91407}" type="datetimeFigureOut">
               <a:rPr lang="en-US" dirty="0"/>
               <a:pPr/>
-              <a:t>10/17/2018</a:t>
+              <a:t>10/20/2018</a:t>
             </a:fld>
             <a:endParaRPr lang="en-US" dirty="0"/>
           </a:p>
@@ -2016,7 +2870,7 @@
           <a:ln/>
           <a:extLst>
             <a:ext uri="{91240B29-F687-4f45-9708-019B960494DF}">
-              <a14:hiddenLine xmlns:a14="http://schemas.microsoft.com/office/drawing/2010/main" xmlns="" w="9525">
+              <a14:hiddenLine xmlns="" xmlns:a14="http://schemas.microsoft.com/office/drawing/2010/main" w="9525">
                 <a:solidFill>
                   <a:srgbClr val="000000"/>
                 </a:solidFill>
@@ -2145,7 +2999,7 @@
             <a:fld id="{ED62726E-379B-B349-9EED-81ED093FA806}" type="datetimeFigureOut">
               <a:rPr lang="en-US" dirty="0"/>
               <a:pPr/>
-              <a:t>10/17/2018</a:t>
+              <a:t>10/20/2018</a:t>
             </a:fld>
             <a:endParaRPr lang="en-US" dirty="0"/>
           </a:p>
@@ -2296,7 +3150,7 @@
           <a:ln/>
           <a:extLst>
             <a:ext uri="{91240B29-F687-4f45-9708-019B960494DF}">
-              <a14:hiddenLine xmlns:a14="http://schemas.microsoft.com/office/drawing/2010/main" xmlns="" w="9525">
+              <a14:hiddenLine xmlns="" xmlns:a14="http://schemas.microsoft.com/office/drawing/2010/main" w="9525">
                 <a:solidFill>
                   <a:srgbClr val="000000"/>
                 </a:solidFill>
@@ -2425,7 +3279,7 @@
             <a:fld id="{9B3A1323-8D79-1946-B0D7-40001CF92E9D}" type="datetimeFigureOut">
               <a:rPr lang="en-US" dirty="0"/>
               <a:pPr/>
-              <a:t>10/17/2018</a:t>
+              <a:t>10/20/2018</a:t>
             </a:fld>
             <a:endParaRPr lang="en-US" dirty="0"/>
           </a:p>
@@ -2765,7 +3619,7 @@
             <a:fld id="{8DFA1846-DA80-1C48-A609-854EA85C59AD}" type="datetimeFigureOut">
               <a:rPr lang="en-US" dirty="0"/>
               <a:pPr/>
-              <a:t>10/17/2018</a:t>
+              <a:t>10/20/2018</a:t>
             </a:fld>
             <a:endParaRPr lang="en-US" dirty="0"/>
           </a:p>
@@ -2916,7 +3770,7 @@
           <a:ln/>
           <a:extLst>
             <a:ext uri="{91240B29-F687-4f45-9708-019B960494DF}">
-              <a14:hiddenLine xmlns:a14="http://schemas.microsoft.com/office/drawing/2010/main" xmlns="" w="9525">
+              <a14:hiddenLine xmlns="" xmlns:a14="http://schemas.microsoft.com/office/drawing/2010/main" w="9525">
                 <a:solidFill>
                   <a:srgbClr val="000000"/>
                 </a:solidFill>
@@ -3101,7 +3955,7 @@
             <a:fld id="{57302355-E14B-8545-A8F8-0FE83CC9D524}" type="datetimeFigureOut">
               <a:rPr lang="en-US" dirty="0"/>
               <a:pPr/>
-              <a:t>10/17/2018</a:t>
+              <a:t>10/20/2018</a:t>
             </a:fld>
             <a:endParaRPr lang="en-US" dirty="0"/>
           </a:p>
@@ -3252,7 +4106,7 @@
           <a:ln/>
           <a:extLst>
             <a:ext uri="{91240B29-F687-4f45-9708-019B960494DF}">
-              <a14:hiddenLine xmlns:a14="http://schemas.microsoft.com/office/drawing/2010/main" xmlns="" w="9525">
+              <a14:hiddenLine xmlns="" xmlns:a14="http://schemas.microsoft.com/office/drawing/2010/main" w="9525">
                 <a:solidFill>
                   <a:srgbClr val="000000"/>
                 </a:solidFill>
@@ -3575,7 +4429,7 @@
             <a:fld id="{02640F58-564D-2B4F-AE67-E407BA4FCF45}" type="datetimeFigureOut">
               <a:rPr lang="en-US" dirty="0"/>
               <a:pPr/>
-              <a:t>10/17/2018</a:t>
+              <a:t>10/20/2018</a:t>
             </a:fld>
             <a:endParaRPr lang="en-US" dirty="0"/>
           </a:p>
@@ -3726,7 +4580,7 @@
           <a:ln/>
           <a:extLst>
             <a:ext uri="{91240B29-F687-4f45-9708-019B960494DF}">
-              <a14:hiddenLine xmlns:a14="http://schemas.microsoft.com/office/drawing/2010/main" xmlns="" w="9525">
+              <a14:hiddenLine xmlns="" xmlns:a14="http://schemas.microsoft.com/office/drawing/2010/main" w="9525">
                 <a:solidFill>
                   <a:srgbClr val="000000"/>
                 </a:solidFill>
@@ -3793,7 +4647,7 @@
             <a:fld id="{F13A34C8-038E-2045-AF43-DF7DBB8E0E9E}" type="datetimeFigureOut">
               <a:rPr lang="en-US" dirty="0"/>
               <a:pPr/>
-              <a:t>10/17/2018</a:t>
+              <a:t>10/20/2018</a:t>
             </a:fld>
             <a:endParaRPr lang="en-US" dirty="0"/>
           </a:p>
@@ -3885,7 +4739,7 @@
             <a:fld id="{8818C68F-D26B-8F47-958C-23B49CF8A634}" type="datetimeFigureOut">
               <a:rPr lang="en-US" dirty="0"/>
               <a:pPr/>
-              <a:t>10/17/2018</a:t>
+              <a:t>10/20/2018</a:t>
             </a:fld>
             <a:endParaRPr lang="en-US" dirty="0"/>
           </a:p>
@@ -4149,7 +5003,7 @@
           <a:ln/>
           <a:extLst>
             <a:ext uri="{91240B29-F687-4f45-9708-019B960494DF}">
-              <a14:hiddenLine xmlns:a14="http://schemas.microsoft.com/office/drawing/2010/main" xmlns="" w="9525">
+              <a14:hiddenLine xmlns="" xmlns:a14="http://schemas.microsoft.com/office/drawing/2010/main" w="9525">
                 <a:solidFill>
                   <a:srgbClr val="000000"/>
                 </a:solidFill>
@@ -4349,7 +5203,7 @@
             <a:fld id="{D0DF5E60-9974-AC48-9591-99C2BB44B7CF}" type="datetimeFigureOut">
               <a:rPr lang="en-US" dirty="0"/>
               <a:pPr/>
-              <a:t>10/17/2018</a:t>
+              <a:t>10/20/2018</a:t>
             </a:fld>
             <a:endParaRPr lang="en-US" dirty="0"/>
           </a:p>
@@ -4659,7 +5513,7 @@
             <a:fld id="{18C79C5D-2A6F-F04D-97DA-BEF2467B64E4}" type="datetimeFigureOut">
               <a:rPr lang="en-US" dirty="0"/>
               <a:pPr/>
-              <a:t>10/17/2018</a:t>
+              <a:t>10/20/2018</a:t>
             </a:fld>
             <a:endParaRPr lang="en-US" dirty="0"/>
           </a:p>
@@ -4926,7 +5780,7 @@
             <a:fld id="{09B482E8-6E0E-1B4F-B1FD-C69DB9E858D9}" type="datetimeFigureOut">
               <a:rPr lang="en-US" dirty="0"/>
               <a:pPr/>
-              <a:t>10/17/2018</a:t>
+              <a:t>10/20/2018</a:t>
             </a:fld>
             <a:endParaRPr lang="en-US" dirty="0"/>
           </a:p>
@@ -9446,240 +10300,34 @@
           </a:extLst>
         </p:spPr>
       </p:pic>
-      <p:sp>
-        <p:nvSpPr>
-          <p:cNvPr id="17" name="CuadroTexto 16">
+      <p:graphicFrame>
+        <p:nvGraphicFramePr>
+          <p:cNvPr id="24" name="Gráfico 23">
             <a:extLst>
               <a:ext uri="{FF2B5EF4-FFF2-40B4-BE49-F238E27FC236}">
-                <a16:creationId xmlns:a16="http://schemas.microsoft.com/office/drawing/2014/main" id="{3F425A7D-246E-4DD9-A48A-A647BEDECC60}"/>
+                <a16:creationId xmlns:a16="http://schemas.microsoft.com/office/drawing/2014/main" id="{CC443F3B-D88D-43DB-B274-68A94E2D8534}"/>
               </a:ext>
             </a:extLst>
           </p:cNvPr>
-          <p:cNvSpPr txBox="1"/>
-          <p:nvPr/>
-        </p:nvSpPr>
-        <p:spPr>
-          <a:xfrm>
-            <a:off x="436273" y="2590637"/>
-            <a:ext cx="571498" cy="369332"/>
-          </a:xfrm>
-          <a:prstGeom prst="rect">
-            <a:avLst/>
-          </a:prstGeom>
-          <a:noFill/>
-        </p:spPr>
-        <p:txBody>
-          <a:bodyPr wrap="square" rtlCol="0">
-            <a:spAutoFit/>
-          </a:bodyPr>
-          <a:lstStyle/>
-          <a:p>
-            <a:r>
-              <a:rPr lang="es-ES" dirty="0">
-                <a:solidFill>
-                  <a:schemeClr val="bg1"/>
-                </a:solidFill>
-              </a:rPr>
-              <a:t>ON</a:t>
-            </a:r>
-          </a:p>
-        </p:txBody>
-      </p:sp>
-      <p:sp>
-        <p:nvSpPr>
-          <p:cNvPr id="19" name="CuadroTexto 18">
-            <a:extLst>
-              <a:ext uri="{FF2B5EF4-FFF2-40B4-BE49-F238E27FC236}">
-                <a16:creationId xmlns:a16="http://schemas.microsoft.com/office/drawing/2014/main" id="{77DCE31C-CA7C-4AFA-B177-932C59B31970}"/>
-              </a:ext>
-            </a:extLst>
-          </p:cNvPr>
-          <p:cNvSpPr txBox="1"/>
-          <p:nvPr/>
-        </p:nvSpPr>
-        <p:spPr>
-          <a:xfrm>
-            <a:off x="436273" y="3285019"/>
-            <a:ext cx="571498" cy="369332"/>
-          </a:xfrm>
-          <a:prstGeom prst="rect">
-            <a:avLst/>
-          </a:prstGeom>
-          <a:noFill/>
-        </p:spPr>
-        <p:txBody>
-          <a:bodyPr wrap="square" rtlCol="0">
-            <a:spAutoFit/>
-          </a:bodyPr>
-          <a:lstStyle/>
-          <a:p>
-            <a:r>
-              <a:rPr lang="es-ES" dirty="0">
-                <a:solidFill>
-                  <a:schemeClr val="bg1"/>
-                </a:solidFill>
-              </a:rPr>
-              <a:t>ON</a:t>
-            </a:r>
-          </a:p>
-        </p:txBody>
-      </p:sp>
-      <p:sp>
-        <p:nvSpPr>
-          <p:cNvPr id="20" name="CuadroTexto 19">
-            <a:extLst>
-              <a:ext uri="{FF2B5EF4-FFF2-40B4-BE49-F238E27FC236}">
-                <a16:creationId xmlns:a16="http://schemas.microsoft.com/office/drawing/2014/main" id="{D5D56B9B-EC66-4BEA-91D1-6E05E38D61D7}"/>
-              </a:ext>
-            </a:extLst>
-          </p:cNvPr>
-          <p:cNvSpPr txBox="1"/>
-          <p:nvPr/>
-        </p:nvSpPr>
-        <p:spPr>
-          <a:xfrm>
-            <a:off x="436273" y="3950476"/>
-            <a:ext cx="571498" cy="369332"/>
-          </a:xfrm>
-          <a:prstGeom prst="rect">
-            <a:avLst/>
-          </a:prstGeom>
-          <a:noFill/>
-        </p:spPr>
-        <p:txBody>
-          <a:bodyPr wrap="square" rtlCol="0">
-            <a:spAutoFit/>
-          </a:bodyPr>
-          <a:lstStyle/>
-          <a:p>
-            <a:r>
-              <a:rPr lang="es-ES" dirty="0">
-                <a:solidFill>
-                  <a:schemeClr val="bg1"/>
-                </a:solidFill>
-              </a:rPr>
-              <a:t>ON</a:t>
-            </a:r>
-          </a:p>
-        </p:txBody>
-      </p:sp>
-      <p:sp>
-        <p:nvSpPr>
-          <p:cNvPr id="21" name="CuadroTexto 20">
-            <a:extLst>
-              <a:ext uri="{FF2B5EF4-FFF2-40B4-BE49-F238E27FC236}">
-                <a16:creationId xmlns:a16="http://schemas.microsoft.com/office/drawing/2014/main" id="{80C5D5F1-D71F-450B-9ACB-5B08E5D74901}"/>
-              </a:ext>
-            </a:extLst>
-          </p:cNvPr>
-          <p:cNvSpPr txBox="1"/>
-          <p:nvPr/>
-        </p:nvSpPr>
-        <p:spPr>
-          <a:xfrm>
-            <a:off x="436273" y="4594494"/>
-            <a:ext cx="571498" cy="369332"/>
-          </a:xfrm>
-          <a:prstGeom prst="rect">
-            <a:avLst/>
-          </a:prstGeom>
-          <a:noFill/>
-        </p:spPr>
-        <p:txBody>
-          <a:bodyPr wrap="square" rtlCol="0">
-            <a:spAutoFit/>
-          </a:bodyPr>
-          <a:lstStyle/>
-          <a:p>
-            <a:r>
-              <a:rPr lang="es-ES" dirty="0">
-                <a:solidFill>
-                  <a:schemeClr val="bg1"/>
-                </a:solidFill>
-              </a:rPr>
-              <a:t>ON</a:t>
-            </a:r>
-          </a:p>
-        </p:txBody>
-      </p:sp>
-      <p:sp>
-        <p:nvSpPr>
-          <p:cNvPr id="22" name="CuadroTexto 21">
-            <a:extLst>
-              <a:ext uri="{FF2B5EF4-FFF2-40B4-BE49-F238E27FC236}">
-                <a16:creationId xmlns:a16="http://schemas.microsoft.com/office/drawing/2014/main" id="{DD8E3E6B-578B-49FF-99A7-AA61907E6869}"/>
-              </a:ext>
-            </a:extLst>
-          </p:cNvPr>
-          <p:cNvSpPr txBox="1"/>
-          <p:nvPr/>
-        </p:nvSpPr>
-        <p:spPr>
-          <a:xfrm>
-            <a:off x="426613" y="5238512"/>
-            <a:ext cx="571498" cy="369332"/>
-          </a:xfrm>
-          <a:prstGeom prst="rect">
-            <a:avLst/>
-          </a:prstGeom>
-          <a:noFill/>
-        </p:spPr>
-        <p:txBody>
-          <a:bodyPr wrap="square" rtlCol="0">
-            <a:spAutoFit/>
-          </a:bodyPr>
-          <a:lstStyle/>
-          <a:p>
-            <a:r>
-              <a:rPr lang="es-ES" dirty="0">
-                <a:solidFill>
-                  <a:schemeClr val="bg1"/>
-                </a:solidFill>
-              </a:rPr>
-              <a:t>ON</a:t>
-            </a:r>
-          </a:p>
-        </p:txBody>
-      </p:sp>
-      <p:sp>
-        <p:nvSpPr>
-          <p:cNvPr id="23" name="CuadroTexto 22">
-            <a:extLst>
-              <a:ext uri="{FF2B5EF4-FFF2-40B4-BE49-F238E27FC236}">
-                <a16:creationId xmlns:a16="http://schemas.microsoft.com/office/drawing/2014/main" id="{41736664-BE89-4031-9217-8F69376E5F9C}"/>
-              </a:ext>
-            </a:extLst>
-          </p:cNvPr>
-          <p:cNvSpPr txBox="1"/>
-          <p:nvPr/>
-        </p:nvSpPr>
-        <p:spPr>
-          <a:xfrm>
-            <a:off x="416953" y="5941219"/>
-            <a:ext cx="571498" cy="369332"/>
-          </a:xfrm>
-          <a:prstGeom prst="rect">
-            <a:avLst/>
-          </a:prstGeom>
-          <a:noFill/>
-        </p:spPr>
-        <p:txBody>
-          <a:bodyPr wrap="square" rtlCol="0">
-            <a:spAutoFit/>
-          </a:bodyPr>
-          <a:lstStyle/>
-          <a:p>
-            <a:r>
-              <a:rPr lang="es-ES" dirty="0">
-                <a:solidFill>
-                  <a:schemeClr val="bg1"/>
-                </a:solidFill>
-              </a:rPr>
-              <a:t>ON</a:t>
-            </a:r>
-          </a:p>
-        </p:txBody>
-      </p:sp>
+          <p:cNvGraphicFramePr/>
+          <p:nvPr>
+            <p:extLst>
+              <p:ext uri="{D42A27DB-BD31-4B8C-83A1-F6EECF244321}">
+                <p14:modId xmlns:p14="http://schemas.microsoft.com/office/powerpoint/2010/main" val="2261256097"/>
+              </p:ext>
+            </p:extLst>
+          </p:nvPr>
+        </p:nvGraphicFramePr>
+        <p:xfrm>
+          <a:off x="2031999" y="2315288"/>
+          <a:ext cx="8128000" cy="4095524"/>
+        </p:xfrm>
+        <a:graphic>
+          <a:graphicData uri="http://schemas.openxmlformats.org/drawingml/2006/chart">
+            <c:chart xmlns:c="http://schemas.openxmlformats.org/drawingml/2006/chart" xmlns:r="http://schemas.openxmlformats.org/officeDocument/2006/relationships" r:id="rId3"/>
+          </a:graphicData>
+        </a:graphic>
+      </p:graphicFrame>
     </p:spTree>
     <p:extLst>
       <p:ext uri="{BB962C8B-B14F-4D97-AF65-F5344CB8AC3E}">

</xml_diff>